<commit_message>
first year model artifact removal
</commit_message>
<xml_diff>
--- a/NetSource_Annual_v_SubAnnual.pptx
+++ b/NetSource_Annual_v_SubAnnual.pptx
@@ -2969,9 +2969,39 @@
           <a:chExt cx="0" cy="0"/>
         </a:xfrm>
       </p:grpSpPr>
+      <p:sp>
+        <p:nvSpPr>
+          <p:cNvPr id="7" name="TextBox 6"/>
+          <p:cNvSpPr txBox="1"/>
+          <p:nvPr/>
+        </p:nvSpPr>
+        <p:spPr>
+          <a:xfrm>
+            <a:off x="416859" y="4585447"/>
+            <a:ext cx="2193951" cy="646331"/>
+          </a:xfrm>
+          <a:prstGeom prst="rect">
+            <a:avLst/>
+          </a:prstGeom>
+          <a:noFill/>
+        </p:spPr>
+        <p:txBody>
+          <a:bodyPr wrap="square" rtlCol="0">
+            <a:spAutoFit/>
+          </a:bodyPr>
+          <a:lstStyle/>
+          <a:p>
+            <a:r>
+              <a:rPr lang="en-US" dirty="0" smtClean="0"/>
+              <a:t>Above 0 line indicates source</a:t>
+            </a:r>
+            <a:endParaRPr lang="en-US" dirty="0"/>
+          </a:p>
+        </p:txBody>
+      </p:sp>
       <p:pic>
         <p:nvPicPr>
-          <p:cNvPr id="4" name="Picture 3"/>
+          <p:cNvPr id="5" name="Picture 4"/>
           <p:cNvPicPr>
             <a:picLocks noChangeAspect="1"/>
           </p:cNvPicPr>
@@ -2991,8 +3021,8 @@
         </p:blipFill>
         <p:spPr>
           <a:xfrm>
-            <a:off x="96211" y="53788"/>
-            <a:ext cx="5029199" cy="4114800"/>
+            <a:off x="5994201" y="0"/>
+            <a:ext cx="5587999" cy="4572000"/>
           </a:xfrm>
           <a:prstGeom prst="rect">
             <a:avLst/>
@@ -3001,7 +3031,7 @@
       </p:pic>
       <p:pic>
         <p:nvPicPr>
-          <p:cNvPr id="2" name="Picture 1"/>
+          <p:cNvPr id="6" name="Picture 5"/>
           <p:cNvPicPr>
             <a:picLocks noChangeAspect="1"/>
           </p:cNvPicPr>
@@ -3021,8 +3051,8 @@
         </p:blipFill>
         <p:spPr>
           <a:xfrm>
-            <a:off x="5125410" y="53788"/>
-            <a:ext cx="5029199" cy="4114800"/>
+            <a:off x="546847" y="13447"/>
+            <a:ext cx="5587999" cy="4572000"/>
           </a:xfrm>
           <a:prstGeom prst="rect">
             <a:avLst/>
@@ -3031,7 +3061,7 @@
       </p:pic>
       <p:pic>
         <p:nvPicPr>
-          <p:cNvPr id="3" name="Picture 2"/>
+          <p:cNvPr id="8" name="Picture 7"/>
           <p:cNvPicPr>
             <a:picLocks noChangeAspect="1"/>
           </p:cNvPicPr>
@@ -3039,49 +3069,19 @@
         </p:nvPicPr>
         <p:blipFill rotWithShape="1">
           <a:blip r:embed="rId4"/>
-          <a:srcRect l="1696" t="9116" r="86171" b="77355"/>
+          <a:srcRect l="1917" t="9926" r="86288" b="77941"/>
           <a:stretch/>
         </p:blipFill>
         <p:spPr>
           <a:xfrm>
-            <a:off x="3065928" y="4410634"/>
-            <a:ext cx="5267155" cy="2447366"/>
+            <a:off x="3012141" y="4685338"/>
+            <a:ext cx="5069541" cy="2172662"/>
           </a:xfrm>
           <a:prstGeom prst="rect">
             <a:avLst/>
           </a:prstGeom>
         </p:spPr>
       </p:pic>
-      <p:sp>
-        <p:nvSpPr>
-          <p:cNvPr id="7" name="TextBox 6"/>
-          <p:cNvSpPr txBox="1"/>
-          <p:nvPr/>
-        </p:nvSpPr>
-        <p:spPr>
-          <a:xfrm>
-            <a:off x="416859" y="4585447"/>
-            <a:ext cx="2193951" cy="646331"/>
-          </a:xfrm>
-          <a:prstGeom prst="rect">
-            <a:avLst/>
-          </a:prstGeom>
-          <a:noFill/>
-        </p:spPr>
-        <p:txBody>
-          <a:bodyPr wrap="square" rtlCol="0">
-            <a:spAutoFit/>
-          </a:bodyPr>
-          <a:lstStyle/>
-          <a:p>
-            <a:r>
-              <a:rPr lang="en-US" dirty="0" smtClean="0"/>
-              <a:t>Above 0 line indicates source</a:t>
-            </a:r>
-            <a:endParaRPr lang="en-US" dirty="0"/>
-          </a:p>
-        </p:txBody>
-      </p:sp>
     </p:spTree>
     <p:extLst>
       <p:ext uri="{BB962C8B-B14F-4D97-AF65-F5344CB8AC3E}">

</xml_diff>